<commit_message>
fix: small picture on management
</commit_message>
<xml_diff>
--- a/assets/img/thumbs.pptx
+++ b/assets/img/thumbs.pptx
@@ -6,6 +6,7 @@
   </p:sldMasterIdLst>
   <p:sldIdLst>
     <p:sldId id="256" r:id="rId2"/>
+    <p:sldId id="257" r:id="rId3"/>
   </p:sldIdLst>
   <p:sldSz cx="12192000" cy="6858000"/>
   <p:notesSz cx="6858000" cy="9144000"/>
@@ -104,6 +105,11 @@
       </a:defRPr>
     </a:lvl9pPr>
   </p:defaultTextStyle>
+  <p:extLst>
+    <p:ext uri="{EFAFB233-063F-42B5-8137-9DF3F51BA10A}">
+      <p15:sldGuideLst xmlns:p15="http://schemas.microsoft.com/office/powerpoint/2012/main"/>
+    </p:ext>
+  </p:extLst>
 </p:presentation>
 </file>
 
@@ -256,7 +262,7 @@
           <a:p>
             <a:fld id="{084A0308-F442-49B4-A7CE-84E02C920A9A}" type="datetimeFigureOut">
               <a:rPr lang="en-NG" smtClean="0"/>
-              <a:t>22/07/2024</a:t>
+              <a:t>23/07/2024</a:t>
             </a:fld>
             <a:endParaRPr lang="en-NG"/>
           </a:p>
@@ -456,7 +462,7 @@
           <a:p>
             <a:fld id="{084A0308-F442-49B4-A7CE-84E02C920A9A}" type="datetimeFigureOut">
               <a:rPr lang="en-NG" smtClean="0"/>
-              <a:t>22/07/2024</a:t>
+              <a:t>23/07/2024</a:t>
             </a:fld>
             <a:endParaRPr lang="en-NG"/>
           </a:p>
@@ -666,7 +672,7 @@
           <a:p>
             <a:fld id="{084A0308-F442-49B4-A7CE-84E02C920A9A}" type="datetimeFigureOut">
               <a:rPr lang="en-NG" smtClean="0"/>
-              <a:t>22/07/2024</a:t>
+              <a:t>23/07/2024</a:t>
             </a:fld>
             <a:endParaRPr lang="en-NG"/>
           </a:p>
@@ -866,7 +872,7 @@
           <a:p>
             <a:fld id="{084A0308-F442-49B4-A7CE-84E02C920A9A}" type="datetimeFigureOut">
               <a:rPr lang="en-NG" smtClean="0"/>
-              <a:t>22/07/2024</a:t>
+              <a:t>23/07/2024</a:t>
             </a:fld>
             <a:endParaRPr lang="en-NG"/>
           </a:p>
@@ -1142,7 +1148,7 @@
           <a:p>
             <a:fld id="{084A0308-F442-49B4-A7CE-84E02C920A9A}" type="datetimeFigureOut">
               <a:rPr lang="en-NG" smtClean="0"/>
-              <a:t>22/07/2024</a:t>
+              <a:t>23/07/2024</a:t>
             </a:fld>
             <a:endParaRPr lang="en-NG"/>
           </a:p>
@@ -1410,7 +1416,7 @@
           <a:p>
             <a:fld id="{084A0308-F442-49B4-A7CE-84E02C920A9A}" type="datetimeFigureOut">
               <a:rPr lang="en-NG" smtClean="0"/>
-              <a:t>22/07/2024</a:t>
+              <a:t>23/07/2024</a:t>
             </a:fld>
             <a:endParaRPr lang="en-NG"/>
           </a:p>
@@ -1825,7 +1831,7 @@
           <a:p>
             <a:fld id="{084A0308-F442-49B4-A7CE-84E02C920A9A}" type="datetimeFigureOut">
               <a:rPr lang="en-NG" smtClean="0"/>
-              <a:t>22/07/2024</a:t>
+              <a:t>23/07/2024</a:t>
             </a:fld>
             <a:endParaRPr lang="en-NG"/>
           </a:p>
@@ -1967,7 +1973,7 @@
           <a:p>
             <a:fld id="{084A0308-F442-49B4-A7CE-84E02C920A9A}" type="datetimeFigureOut">
               <a:rPr lang="en-NG" smtClean="0"/>
-              <a:t>22/07/2024</a:t>
+              <a:t>23/07/2024</a:t>
             </a:fld>
             <a:endParaRPr lang="en-NG"/>
           </a:p>
@@ -2080,7 +2086,7 @@
           <a:p>
             <a:fld id="{084A0308-F442-49B4-A7CE-84E02C920A9A}" type="datetimeFigureOut">
               <a:rPr lang="en-NG" smtClean="0"/>
-              <a:t>22/07/2024</a:t>
+              <a:t>23/07/2024</a:t>
             </a:fld>
             <a:endParaRPr lang="en-NG"/>
           </a:p>
@@ -2393,7 +2399,7 @@
           <a:p>
             <a:fld id="{084A0308-F442-49B4-A7CE-84E02C920A9A}" type="datetimeFigureOut">
               <a:rPr lang="en-NG" smtClean="0"/>
-              <a:t>22/07/2024</a:t>
+              <a:t>23/07/2024</a:t>
             </a:fld>
             <a:endParaRPr lang="en-NG"/>
           </a:p>
@@ -2682,7 +2688,7 @@
           <a:p>
             <a:fld id="{084A0308-F442-49B4-A7CE-84E02C920A9A}" type="datetimeFigureOut">
               <a:rPr lang="en-NG" smtClean="0"/>
-              <a:t>22/07/2024</a:t>
+              <a:t>23/07/2024</a:t>
             </a:fld>
             <a:endParaRPr lang="en-NG"/>
           </a:p>
@@ -2925,7 +2931,7 @@
           <a:p>
             <a:fld id="{084A0308-F442-49B4-A7CE-84E02C920A9A}" type="datetimeFigureOut">
               <a:rPr lang="en-NG" smtClean="0"/>
-              <a:t>22/07/2024</a:t>
+              <a:t>23/07/2024</a:t>
             </a:fld>
             <a:endParaRPr lang="en-NG"/>
           </a:p>
@@ -3755,6 +3761,185 @@
 </p:sld>
 </file>
 
+<file path=ppt/slides/slide2.xml><?xml version="1.0" encoding="utf-8"?>
+<p:sld xmlns:a="http://schemas.openxmlformats.org/drawingml/2006/main" xmlns:r="http://schemas.openxmlformats.org/officeDocument/2006/relationships" xmlns:p="http://schemas.openxmlformats.org/presentationml/2006/main">
+  <p:cSld>
+    <p:spTree>
+      <p:nvGrpSpPr>
+        <p:cNvPr id="1" name=""/>
+        <p:cNvGrpSpPr/>
+        <p:nvPr/>
+      </p:nvGrpSpPr>
+      <p:grpSpPr>
+        <a:xfrm>
+          <a:off x="0" y="0"/>
+          <a:ext cx="0" cy="0"/>
+          <a:chOff x="0" y="0"/>
+          <a:chExt cx="0" cy="0"/>
+        </a:xfrm>
+      </p:grpSpPr>
+      <p:sp>
+        <p:nvSpPr>
+          <p:cNvPr id="2" name="Title 1">
+            <a:extLst>
+              <a:ext uri="{FF2B5EF4-FFF2-40B4-BE49-F238E27FC236}">
+                <a16:creationId xmlns:a16="http://schemas.microsoft.com/office/drawing/2014/main" id="{D7CE0B68-C09C-9150-7696-C3DF0FF27475}"/>
+              </a:ext>
+            </a:extLst>
+          </p:cNvPr>
+          <p:cNvSpPr>
+            <a:spLocks noGrp="1"/>
+          </p:cNvSpPr>
+          <p:nvPr>
+            <p:ph type="title"/>
+          </p:nvPr>
+        </p:nvSpPr>
+        <p:spPr/>
+        <p:txBody>
+          <a:bodyPr/>
+          <a:lstStyle/>
+          <a:p>
+            <a:endParaRPr lang="en-NG"/>
+          </a:p>
+        </p:txBody>
+      </p:sp>
+      <p:pic>
+        <p:nvPicPr>
+          <p:cNvPr id="5" name="Content Placeholder 4">
+            <a:extLst>
+              <a:ext uri="{FF2B5EF4-FFF2-40B4-BE49-F238E27FC236}">
+                <a16:creationId xmlns:a16="http://schemas.microsoft.com/office/drawing/2014/main" id="{ABC950C1-5A4B-9F56-41E6-839145841999}"/>
+              </a:ext>
+            </a:extLst>
+          </p:cNvPr>
+          <p:cNvPicPr>
+            <a:picLocks noGrp="1" noChangeAspect="1"/>
+          </p:cNvPicPr>
+          <p:nvPr>
+            <p:ph idx="1"/>
+          </p:nvPr>
+        </p:nvPicPr>
+        <p:blipFill>
+          <a:blip r:embed="rId2">
+            <a:extLst>
+              <a:ext uri="{28A0092B-C50C-407E-A947-70E740481C1C}">
+                <a14:useLocalDpi xmlns:a14="http://schemas.microsoft.com/office/drawing/2010/main" val="0"/>
+              </a:ext>
+            </a:extLst>
+          </a:blip>
+          <a:stretch>
+            <a:fillRect/>
+          </a:stretch>
+        </p:blipFill>
+        <p:spPr>
+          <a:xfrm>
+            <a:off x="3128033" y="1253331"/>
+            <a:ext cx="3223213" cy="4351338"/>
+          </a:xfrm>
+        </p:spPr>
+      </p:pic>
+      <p:sp>
+        <p:nvSpPr>
+          <p:cNvPr id="6" name="Rectangle 5">
+            <a:extLst>
+              <a:ext uri="{FF2B5EF4-FFF2-40B4-BE49-F238E27FC236}">
+                <a16:creationId xmlns:a16="http://schemas.microsoft.com/office/drawing/2014/main" id="{E774F660-0C6A-7C09-5634-E2A757FDC944}"/>
+              </a:ext>
+            </a:extLst>
+          </p:cNvPr>
+          <p:cNvSpPr/>
+          <p:nvPr/>
+        </p:nvSpPr>
+        <p:spPr>
+          <a:xfrm>
+            <a:off x="8279153" y="1568768"/>
+            <a:ext cx="3222000" cy="4352400"/>
+          </a:xfrm>
+          <a:prstGeom prst="rect">
+            <a:avLst/>
+          </a:prstGeom>
+          <a:solidFill>
+            <a:schemeClr val="bg1"/>
+          </a:solidFill>
+          <a:ln w="3175">
+            <a:solidFill>
+              <a:schemeClr val="tx1"/>
+            </a:solidFill>
+          </a:ln>
+        </p:spPr>
+        <p:style>
+          <a:lnRef idx="2">
+            <a:schemeClr val="accent1">
+              <a:shade val="15000"/>
+            </a:schemeClr>
+          </a:lnRef>
+          <a:fillRef idx="1">
+            <a:schemeClr val="accent1"/>
+          </a:fillRef>
+          <a:effectRef idx="0">
+            <a:schemeClr val="accent1"/>
+          </a:effectRef>
+          <a:fontRef idx="minor">
+            <a:schemeClr val="lt1"/>
+          </a:fontRef>
+        </p:style>
+        <p:txBody>
+          <a:bodyPr rtlCol="0" anchor="ctr"/>
+          <a:lstStyle/>
+          <a:p>
+            <a:pPr algn="ctr"/>
+            <a:endParaRPr lang="en-NG" dirty="0"/>
+          </a:p>
+        </p:txBody>
+      </p:sp>
+      <p:pic>
+        <p:nvPicPr>
+          <p:cNvPr id="7" name="Picture 6">
+            <a:extLst>
+              <a:ext uri="{FF2B5EF4-FFF2-40B4-BE49-F238E27FC236}">
+                <a16:creationId xmlns:a16="http://schemas.microsoft.com/office/drawing/2014/main" id="{0536C575-7DCC-239E-C62F-1D429EE2993E}"/>
+              </a:ext>
+            </a:extLst>
+          </p:cNvPr>
+          <p:cNvPicPr>
+            <a:picLocks noChangeAspect="1"/>
+          </p:cNvPicPr>
+          <p:nvPr/>
+        </p:nvPicPr>
+        <p:blipFill rotWithShape="1">
+          <a:blip r:embed="rId3">
+            <a:extLst>
+              <a:ext uri="{28A0092B-C50C-407E-A947-70E740481C1C}">
+                <a14:useLocalDpi xmlns:a14="http://schemas.microsoft.com/office/drawing/2010/main" val="0"/>
+              </a:ext>
+            </a:extLst>
+          </a:blip>
+          <a:srcRect l="23578" t="4458" r="25758" b="40816"/>
+          <a:stretch/>
+        </p:blipFill>
+        <p:spPr>
+          <a:xfrm>
+            <a:off x="0" y="1471479"/>
+            <a:ext cx="3223214" cy="4352399"/>
+          </a:xfrm>
+          <a:prstGeom prst="rect">
+            <a:avLst/>
+          </a:prstGeom>
+        </p:spPr>
+      </p:pic>
+    </p:spTree>
+    <p:extLst>
+      <p:ext uri="{BB962C8B-B14F-4D97-AF65-F5344CB8AC3E}">
+        <p14:creationId xmlns:p14="http://schemas.microsoft.com/office/powerpoint/2010/main" val="579352480"/>
+      </p:ext>
+    </p:extLst>
+  </p:cSld>
+  <p:clrMapOvr>
+    <a:masterClrMapping/>
+  </p:clrMapOvr>
+</p:sld>
+</file>
+
 <file path=ppt/theme/theme1.xml><?xml version="1.0" encoding="utf-8"?>
 <a:theme xmlns:a="http://schemas.openxmlformats.org/drawingml/2006/main" name="Office Theme">
   <a:themeElements>

</xml_diff>